<commit_message>
Updates to Design Documents
</commit_message>
<xml_diff>
--- a/Doc/Diagrams.pptx
+++ b/Doc/Diagrams.pptx
@@ -107,6 +107,11 @@
       </a:defRPr>
     </a:lvl9pPr>
   </p:defaultTextStyle>
+  <p:extLst>
+    <p:ext uri="{EFAFB233-063F-42B5-8137-9DF3F51BA10A}">
+      <p15:sldGuideLst xmlns:p15="http://schemas.microsoft.com/office/powerpoint/2012/main"/>
+    </p:ext>
+  </p:extLst>
 </p:presentation>
 </file>
 
@@ -241,7 +246,7 @@
           <a:p>
             <a:fld id="{4006056E-2430-4A3F-BD7E-F7FA9BF1F257}" type="datetimeFigureOut">
               <a:rPr lang="en-US" smtClean="0"/>
-              <a:t>4/21/2019</a:t>
+              <a:t>4/22/2019</a:t>
             </a:fld>
             <a:endParaRPr lang="en-US"/>
           </a:p>
@@ -411,7 +416,7 @@
           <a:p>
             <a:fld id="{4006056E-2430-4A3F-BD7E-F7FA9BF1F257}" type="datetimeFigureOut">
               <a:rPr lang="en-US" smtClean="0"/>
-              <a:t>4/21/2019</a:t>
+              <a:t>4/22/2019</a:t>
             </a:fld>
             <a:endParaRPr lang="en-US"/>
           </a:p>
@@ -591,7 +596,7 @@
           <a:p>
             <a:fld id="{4006056E-2430-4A3F-BD7E-F7FA9BF1F257}" type="datetimeFigureOut">
               <a:rPr lang="en-US" smtClean="0"/>
-              <a:t>4/21/2019</a:t>
+              <a:t>4/22/2019</a:t>
             </a:fld>
             <a:endParaRPr lang="en-US"/>
           </a:p>
@@ -761,7 +766,7 @@
           <a:p>
             <a:fld id="{4006056E-2430-4A3F-BD7E-F7FA9BF1F257}" type="datetimeFigureOut">
               <a:rPr lang="en-US" smtClean="0"/>
-              <a:t>4/21/2019</a:t>
+              <a:t>4/22/2019</a:t>
             </a:fld>
             <a:endParaRPr lang="en-US"/>
           </a:p>
@@ -1005,7 +1010,7 @@
           <a:p>
             <a:fld id="{4006056E-2430-4A3F-BD7E-F7FA9BF1F257}" type="datetimeFigureOut">
               <a:rPr lang="en-US" smtClean="0"/>
-              <a:t>4/21/2019</a:t>
+              <a:t>4/22/2019</a:t>
             </a:fld>
             <a:endParaRPr lang="en-US"/>
           </a:p>
@@ -1237,7 +1242,7 @@
           <a:p>
             <a:fld id="{4006056E-2430-4A3F-BD7E-F7FA9BF1F257}" type="datetimeFigureOut">
               <a:rPr lang="en-US" smtClean="0"/>
-              <a:t>4/21/2019</a:t>
+              <a:t>4/22/2019</a:t>
             </a:fld>
             <a:endParaRPr lang="en-US"/>
           </a:p>
@@ -1604,7 +1609,7 @@
           <a:p>
             <a:fld id="{4006056E-2430-4A3F-BD7E-F7FA9BF1F257}" type="datetimeFigureOut">
               <a:rPr lang="en-US" smtClean="0"/>
-              <a:t>4/21/2019</a:t>
+              <a:t>4/22/2019</a:t>
             </a:fld>
             <a:endParaRPr lang="en-US"/>
           </a:p>
@@ -1722,7 +1727,7 @@
           <a:p>
             <a:fld id="{4006056E-2430-4A3F-BD7E-F7FA9BF1F257}" type="datetimeFigureOut">
               <a:rPr lang="en-US" smtClean="0"/>
-              <a:t>4/21/2019</a:t>
+              <a:t>4/22/2019</a:t>
             </a:fld>
             <a:endParaRPr lang="en-US"/>
           </a:p>
@@ -1817,7 +1822,7 @@
           <a:p>
             <a:fld id="{4006056E-2430-4A3F-BD7E-F7FA9BF1F257}" type="datetimeFigureOut">
               <a:rPr lang="en-US" smtClean="0"/>
-              <a:t>4/21/2019</a:t>
+              <a:t>4/22/2019</a:t>
             </a:fld>
             <a:endParaRPr lang="en-US"/>
           </a:p>
@@ -2094,7 +2099,7 @@
           <a:p>
             <a:fld id="{4006056E-2430-4A3F-BD7E-F7FA9BF1F257}" type="datetimeFigureOut">
               <a:rPr lang="en-US" smtClean="0"/>
-              <a:t>4/21/2019</a:t>
+              <a:t>4/22/2019</a:t>
             </a:fld>
             <a:endParaRPr lang="en-US"/>
           </a:p>
@@ -2351,7 +2356,7 @@
           <a:p>
             <a:fld id="{4006056E-2430-4A3F-BD7E-F7FA9BF1F257}" type="datetimeFigureOut">
               <a:rPr lang="en-US" smtClean="0"/>
-              <a:t>4/21/2019</a:t>
+              <a:t>4/22/2019</a:t>
             </a:fld>
             <a:endParaRPr lang="en-US"/>
           </a:p>
@@ -2564,7 +2569,7 @@
           <a:p>
             <a:fld id="{4006056E-2430-4A3F-BD7E-F7FA9BF1F257}" type="datetimeFigureOut">
               <a:rPr lang="en-US" smtClean="0"/>
-              <a:t>4/21/2019</a:t>
+              <a:t>4/22/2019</a:t>
             </a:fld>
             <a:endParaRPr lang="en-US"/>
           </a:p>
@@ -3976,8 +3981,8 @@
         </p:nvSpPr>
         <p:spPr>
           <a:xfrm>
-            <a:off x="3715287" y="2432072"/>
-            <a:ext cx="1105784" cy="738664"/>
+            <a:off x="3728468" y="2392907"/>
+            <a:ext cx="1626908" cy="954107"/>
           </a:xfrm>
           <a:prstGeom prst="rect">
             <a:avLst/>
@@ -3993,14 +3998,21 @@
             <a:pPr algn="ctr"/>
             <a:r>
               <a:rPr lang="en-US" sz="1400" dirty="0"/>
-              <a:t>Timeout</a:t>
-            </a:r>
-          </a:p>
-          <a:p>
-            <a:pPr algn="ctr"/>
-            <a:r>
-              <a:rPr lang="en-US" sz="1400" dirty="0"/>
-              <a:t>-----------------</a:t>
+              <a:t>Timeout or </a:t>
+            </a:r>
+          </a:p>
+          <a:p>
+            <a:pPr algn="ctr"/>
+            <a:r>
+              <a:rPr lang="en-US" sz="1400" dirty="0"/>
+              <a:t>Receive DECLINED</a:t>
+            </a:r>
+          </a:p>
+          <a:p>
+            <a:pPr algn="ctr"/>
+            <a:r>
+              <a:rPr lang="en-US" sz="1400" dirty="0"/>
+              <a:t>--------------------------</a:t>
             </a:r>
           </a:p>
           <a:p>
@@ -4093,72 +4105,6 @@
           <a:chExt cx="0" cy="0"/>
         </a:xfrm>
       </p:grpSpPr>
-      <p:sp>
-        <p:nvSpPr>
-          <p:cNvPr id="24" name="Oval 23">
-            <a:extLst>
-              <a:ext uri="{FF2B5EF4-FFF2-40B4-BE49-F238E27FC236}">
-                <a16:creationId xmlns:a16="http://schemas.microsoft.com/office/drawing/2014/main" id="{7BD85838-35C8-4DC4-81EA-A0E9EFD74D23}"/>
-              </a:ext>
-            </a:extLst>
-          </p:cNvPr>
-          <p:cNvSpPr/>
-          <p:nvPr/>
-        </p:nvSpPr>
-        <p:spPr>
-          <a:xfrm>
-            <a:off x="3950355" y="1255710"/>
-            <a:ext cx="1473958" cy="968991"/>
-          </a:xfrm>
-          <a:prstGeom prst="ellipse">
-            <a:avLst/>
-          </a:prstGeom>
-          <a:solidFill>
-            <a:schemeClr val="bg1"/>
-          </a:solidFill>
-          <a:ln w="28575">
-            <a:solidFill>
-              <a:schemeClr val="tx1"/>
-            </a:solidFill>
-          </a:ln>
-        </p:spPr>
-        <p:style>
-          <a:lnRef idx="2">
-            <a:schemeClr val="accent1">
-              <a:shade val="50000"/>
-            </a:schemeClr>
-          </a:lnRef>
-          <a:fillRef idx="1">
-            <a:schemeClr val="accent1"/>
-          </a:fillRef>
-          <a:effectRef idx="0">
-            <a:schemeClr val="accent1"/>
-          </a:effectRef>
-          <a:fontRef idx="minor">
-            <a:schemeClr val="lt1"/>
-          </a:fontRef>
-        </p:style>
-        <p:txBody>
-          <a:bodyPr rot="0" spcFirstLastPara="0" vertOverflow="overflow" horzOverflow="overflow" vert="horz" wrap="square" lIns="91440" tIns="45720" rIns="91440" bIns="45720" numCol="1" spcCol="0" rtlCol="0" fromWordArt="0" anchor="ctr" anchorCtr="0" forceAA="0" compatLnSpc="1">
-            <a:prstTxWarp prst="textNoShape">
-              <a:avLst/>
-            </a:prstTxWarp>
-            <a:noAutofit/>
-          </a:bodyPr>
-          <a:lstStyle/>
-          <a:p>
-            <a:pPr algn="ctr"/>
-            <a:r>
-              <a:rPr lang="en-US" sz="1600" dirty="0">
-                <a:solidFill>
-                  <a:sysClr val="windowText" lastClr="000000"/>
-                </a:solidFill>
-              </a:rPr>
-              <a:t>Wait for Hello</a:t>
-            </a:r>
-          </a:p>
-        </p:txBody>
-      </p:sp>
       <p:cxnSp>
         <p:nvCxnSpPr>
           <p:cNvPr id="30" name="Straight Arrow Connector 29">
@@ -4608,8 +4554,8 @@
         </p:nvSpPr>
         <p:spPr>
           <a:xfrm>
-            <a:off x="5972954" y="1208395"/>
-            <a:ext cx="1850635" cy="954107"/>
+            <a:off x="5996611" y="1148745"/>
+            <a:ext cx="2185015" cy="1169551"/>
           </a:xfrm>
           <a:prstGeom prst="rect">
             <a:avLst/>
@@ -4617,7 +4563,7 @@
           <a:noFill/>
         </p:spPr>
         <p:txBody>
-          <a:bodyPr wrap="none" rtlCol="0">
+          <a:bodyPr wrap="square" rtlCol="0">
             <a:spAutoFit/>
           </a:bodyPr>
           <a:lstStyle/>
@@ -4625,14 +4571,21 @@
             <a:pPr algn="ctr"/>
             <a:r>
               <a:rPr lang="en-US" sz="1400" dirty="0"/>
-              <a:t>Receive HELLO</a:t>
-            </a:r>
-          </a:p>
-          <a:p>
-            <a:pPr algn="ctr"/>
-            <a:r>
-              <a:rPr lang="en-US" sz="1400" dirty="0"/>
-              <a:t>----------------------------</a:t>
+              <a:t>Receive HELLO,</a:t>
+            </a:r>
+          </a:p>
+          <a:p>
+            <a:pPr algn="ctr"/>
+            <a:r>
+              <a:rPr lang="en-US" sz="1400" dirty="0"/>
+              <a:t> client is subscribed</a:t>
+            </a:r>
+          </a:p>
+          <a:p>
+            <a:pPr algn="ctr"/>
+            <a:r>
+              <a:rPr lang="en-US" sz="1400" dirty="0"/>
+              <a:t>---------------------------------</a:t>
             </a:r>
           </a:p>
           <a:p>
@@ -4777,7 +4730,7 @@
         </p:nvSpPr>
         <p:spPr>
           <a:xfrm>
-            <a:off x="878112" y="2384629"/>
+            <a:off x="394782" y="2921375"/>
             <a:ext cx="2466477" cy="738664"/>
           </a:xfrm>
           <a:prstGeom prst="rect">
@@ -5176,6 +5129,291 @@
           </a:fontRef>
         </p:style>
       </p:cxnSp>
+      <p:sp>
+        <p:nvSpPr>
+          <p:cNvPr id="34" name="TextBox 33">
+            <a:extLst>
+              <a:ext uri="{FF2B5EF4-FFF2-40B4-BE49-F238E27FC236}">
+                <a16:creationId xmlns:a16="http://schemas.microsoft.com/office/drawing/2014/main" id="{5B5C7D30-D6F2-4207-B98B-BF456F65BFF9}"/>
+              </a:ext>
+            </a:extLst>
+          </p:cNvPr>
+          <p:cNvSpPr txBox="1"/>
+          <p:nvPr/>
+        </p:nvSpPr>
+        <p:spPr>
+          <a:xfrm>
+            <a:off x="7736794" y="3322106"/>
+            <a:ext cx="1428734" cy="954107"/>
+          </a:xfrm>
+          <a:prstGeom prst="rect">
+            <a:avLst/>
+          </a:prstGeom>
+          <a:noFill/>
+        </p:spPr>
+        <p:txBody>
+          <a:bodyPr wrap="square" rtlCol="0">
+            <a:spAutoFit/>
+          </a:bodyPr>
+          <a:lstStyle/>
+          <a:p>
+            <a:pPr algn="ctr"/>
+            <a:r>
+              <a:rPr lang="en-US" sz="1400" dirty="0"/>
+              <a:t>Timer about to expire</a:t>
+            </a:r>
+          </a:p>
+          <a:p>
+            <a:pPr algn="ctr"/>
+            <a:r>
+              <a:rPr lang="en-US" sz="1400" dirty="0"/>
+              <a:t>-----------------</a:t>
+            </a:r>
+          </a:p>
+          <a:p>
+            <a:pPr algn="ctr"/>
+            <a:r>
+              <a:rPr lang="en-US" sz="1400" dirty="0"/>
+              <a:t>Reset timer</a:t>
+            </a:r>
+          </a:p>
+        </p:txBody>
+      </p:sp>
+      <p:sp>
+        <p:nvSpPr>
+          <p:cNvPr id="35" name="Oval 34">
+            <a:extLst>
+              <a:ext uri="{FF2B5EF4-FFF2-40B4-BE49-F238E27FC236}">
+                <a16:creationId xmlns:a16="http://schemas.microsoft.com/office/drawing/2014/main" id="{612630CC-BCDE-4291-8A9D-1363E85D8ECC}"/>
+              </a:ext>
+            </a:extLst>
+          </p:cNvPr>
+          <p:cNvSpPr>
+            <a:spLocks noChangeAspect="1"/>
+          </p:cNvSpPr>
+          <p:nvPr/>
+        </p:nvSpPr>
+        <p:spPr>
+          <a:xfrm flipV="1">
+            <a:off x="3943351" y="1029500"/>
+            <a:ext cx="458225" cy="458225"/>
+          </a:xfrm>
+          <a:prstGeom prst="ellipse">
+            <a:avLst/>
+          </a:prstGeom>
+          <a:noFill/>
+          <a:ln>
+            <a:solidFill>
+              <a:schemeClr val="tx1"/>
+            </a:solidFill>
+          </a:ln>
+        </p:spPr>
+        <p:style>
+          <a:lnRef idx="2">
+            <a:schemeClr val="accent1">
+              <a:shade val="50000"/>
+            </a:schemeClr>
+          </a:lnRef>
+          <a:fillRef idx="1">
+            <a:schemeClr val="accent1"/>
+          </a:fillRef>
+          <a:effectRef idx="0">
+            <a:schemeClr val="accent1"/>
+          </a:effectRef>
+          <a:fontRef idx="minor">
+            <a:schemeClr val="lt1"/>
+          </a:fontRef>
+        </p:style>
+        <p:txBody>
+          <a:bodyPr rot="0" spcFirstLastPara="0" vertOverflow="overflow" horzOverflow="overflow" vert="horz" wrap="square" lIns="91440" tIns="45720" rIns="91440" bIns="45720" numCol="1" spcCol="0" rtlCol="0" fromWordArt="0" anchor="ctr" anchorCtr="0" forceAA="0" compatLnSpc="1">
+            <a:prstTxWarp prst="textNoShape">
+              <a:avLst/>
+            </a:prstTxWarp>
+            <a:noAutofit/>
+          </a:bodyPr>
+          <a:lstStyle/>
+          <a:p>
+            <a:pPr algn="ctr"/>
+            <a:endParaRPr lang="en-US"/>
+          </a:p>
+        </p:txBody>
+      </p:sp>
+      <p:sp>
+        <p:nvSpPr>
+          <p:cNvPr id="36" name="Isosceles Triangle 35">
+            <a:extLst>
+              <a:ext uri="{FF2B5EF4-FFF2-40B4-BE49-F238E27FC236}">
+                <a16:creationId xmlns:a16="http://schemas.microsoft.com/office/drawing/2014/main" id="{5460924D-BD59-4D21-9634-5934795831E0}"/>
+              </a:ext>
+            </a:extLst>
+          </p:cNvPr>
+          <p:cNvSpPr>
+            <a:spLocks noChangeAspect="1"/>
+          </p:cNvSpPr>
+          <p:nvPr/>
+        </p:nvSpPr>
+        <p:spPr>
+          <a:xfrm flipV="1">
+            <a:off x="3892912" y="1203706"/>
+            <a:ext cx="127379" cy="109809"/>
+          </a:xfrm>
+          <a:prstGeom prst="triangle">
+            <a:avLst/>
+          </a:prstGeom>
+        </p:spPr>
+        <p:style>
+          <a:lnRef idx="2">
+            <a:schemeClr val="dk1">
+              <a:shade val="50000"/>
+            </a:schemeClr>
+          </a:lnRef>
+          <a:fillRef idx="1">
+            <a:schemeClr val="dk1"/>
+          </a:fillRef>
+          <a:effectRef idx="0">
+            <a:schemeClr val="dk1"/>
+          </a:effectRef>
+          <a:fontRef idx="minor">
+            <a:schemeClr val="lt1"/>
+          </a:fontRef>
+        </p:style>
+        <p:txBody>
+          <a:bodyPr rot="0" spcFirstLastPara="0" vertOverflow="overflow" horzOverflow="overflow" vert="horz" wrap="square" lIns="91440" tIns="45720" rIns="91440" bIns="45720" numCol="1" spcCol="0" rtlCol="0" fromWordArt="0" anchor="ctr" anchorCtr="0" forceAA="0" compatLnSpc="1">
+            <a:prstTxWarp prst="textNoShape">
+              <a:avLst/>
+            </a:prstTxWarp>
+            <a:noAutofit/>
+          </a:bodyPr>
+          <a:lstStyle/>
+          <a:p>
+            <a:pPr algn="ctr"/>
+            <a:endParaRPr lang="en-US"/>
+          </a:p>
+        </p:txBody>
+      </p:sp>
+      <p:sp>
+        <p:nvSpPr>
+          <p:cNvPr id="42" name="TextBox 41">
+            <a:extLst>
+              <a:ext uri="{FF2B5EF4-FFF2-40B4-BE49-F238E27FC236}">
+                <a16:creationId xmlns:a16="http://schemas.microsoft.com/office/drawing/2014/main" id="{5656FD82-5E47-4223-BFBC-2CCBD0F92FDD}"/>
+              </a:ext>
+            </a:extLst>
+          </p:cNvPr>
+          <p:cNvSpPr txBox="1"/>
+          <p:nvPr/>
+        </p:nvSpPr>
+        <p:spPr>
+          <a:xfrm>
+            <a:off x="2101344" y="352866"/>
+            <a:ext cx="2185015" cy="954107"/>
+          </a:xfrm>
+          <a:prstGeom prst="rect">
+            <a:avLst/>
+          </a:prstGeom>
+          <a:noFill/>
+        </p:spPr>
+        <p:txBody>
+          <a:bodyPr wrap="square" rtlCol="0">
+            <a:spAutoFit/>
+          </a:bodyPr>
+          <a:lstStyle/>
+          <a:p>
+            <a:pPr algn="ctr"/>
+            <a:r>
+              <a:rPr lang="en-US" sz="1400" dirty="0"/>
+              <a:t>Receive HELLO,</a:t>
+            </a:r>
+          </a:p>
+          <a:p>
+            <a:pPr algn="ctr"/>
+            <a:r>
+              <a:rPr lang="en-US" sz="1400" dirty="0"/>
+              <a:t> client is not subscribed</a:t>
+            </a:r>
+          </a:p>
+          <a:p>
+            <a:pPr algn="ctr"/>
+            <a:r>
+              <a:rPr lang="en-US" sz="1400" dirty="0"/>
+              <a:t>--------------------------------</a:t>
+            </a:r>
+          </a:p>
+          <a:p>
+            <a:pPr algn="ctr"/>
+            <a:r>
+              <a:rPr lang="en-US" sz="1400" dirty="0"/>
+              <a:t>Send DECLINED</a:t>
+            </a:r>
+          </a:p>
+        </p:txBody>
+      </p:sp>
+      <p:sp>
+        <p:nvSpPr>
+          <p:cNvPr id="24" name="Oval 23">
+            <a:extLst>
+              <a:ext uri="{FF2B5EF4-FFF2-40B4-BE49-F238E27FC236}">
+                <a16:creationId xmlns:a16="http://schemas.microsoft.com/office/drawing/2014/main" id="{7BD85838-35C8-4DC4-81EA-A0E9EFD74D23}"/>
+              </a:ext>
+            </a:extLst>
+          </p:cNvPr>
+          <p:cNvSpPr/>
+          <p:nvPr/>
+        </p:nvSpPr>
+        <p:spPr>
+          <a:xfrm>
+            <a:off x="3950355" y="1255710"/>
+            <a:ext cx="1473958" cy="968991"/>
+          </a:xfrm>
+          <a:prstGeom prst="ellipse">
+            <a:avLst/>
+          </a:prstGeom>
+          <a:solidFill>
+            <a:schemeClr val="bg1"/>
+          </a:solidFill>
+          <a:ln w="28575">
+            <a:solidFill>
+              <a:schemeClr val="tx1"/>
+            </a:solidFill>
+          </a:ln>
+        </p:spPr>
+        <p:style>
+          <a:lnRef idx="2">
+            <a:schemeClr val="accent1">
+              <a:shade val="50000"/>
+            </a:schemeClr>
+          </a:lnRef>
+          <a:fillRef idx="1">
+            <a:schemeClr val="accent1"/>
+          </a:fillRef>
+          <a:effectRef idx="0">
+            <a:schemeClr val="accent1"/>
+          </a:effectRef>
+          <a:fontRef idx="minor">
+            <a:schemeClr val="lt1"/>
+          </a:fontRef>
+        </p:style>
+        <p:txBody>
+          <a:bodyPr rot="0" spcFirstLastPara="0" vertOverflow="overflow" horzOverflow="overflow" vert="horz" wrap="square" lIns="91440" tIns="45720" rIns="91440" bIns="45720" numCol="1" spcCol="0" rtlCol="0" fromWordArt="0" anchor="ctr" anchorCtr="0" forceAA="0" compatLnSpc="1">
+            <a:prstTxWarp prst="textNoShape">
+              <a:avLst/>
+            </a:prstTxWarp>
+            <a:noAutofit/>
+          </a:bodyPr>
+          <a:lstStyle/>
+          <a:p>
+            <a:pPr algn="ctr"/>
+            <a:r>
+              <a:rPr lang="en-US" sz="1600" dirty="0">
+                <a:solidFill>
+                  <a:sysClr val="windowText" lastClr="000000"/>
+                </a:solidFill>
+              </a:rPr>
+              <a:t>Wait for Hello</a:t>
+            </a:r>
+          </a:p>
+        </p:txBody>
+      </p:sp>
     </p:spTree>
     <p:extLst>
       <p:ext uri="{BB962C8B-B14F-4D97-AF65-F5344CB8AC3E}">

</xml_diff>